<commit_message>
added - create/log_in user - create country/location/portfolio
</commit_message>
<xml_diff>
--- a/Pickagrapher.pptx
+++ b/Pickagrapher.pptx
@@ -7328,13 +7328,6 @@
               </a:rPr>
               <a:t>Tang Tang Studio</a:t>
             </a:r>
-            <a:endParaRPr lang="en-US" b="1" dirty="0" smtClean="0">
-              <a:solidFill>
-                <a:schemeClr val="tx1"/>
-              </a:solidFill>
-              <a:latin typeface="Calibri Light" panose="020F0302020204030204" pitchFamily="34" charset="0"/>
-              <a:cs typeface="Calibri Light" panose="020F0302020204030204" pitchFamily="34" charset="0"/>
-            </a:endParaRPr>
           </a:p>
         </p:txBody>
       </p:sp>
@@ -7769,13 +7762,6 @@
               </a:rPr>
               <a:t>Brand</a:t>
             </a:r>
-            <a:endParaRPr lang="en-US" sz="1200" b="1" dirty="0" smtClean="0">
-              <a:solidFill>
-                <a:schemeClr val="tx1"/>
-              </a:solidFill>
-              <a:latin typeface="Calibri Light" panose="020F0302020204030204" pitchFamily="34" charset="0"/>
-              <a:cs typeface="Calibri Light" panose="020F0302020204030204" pitchFamily="34" charset="0"/>
-            </a:endParaRPr>
           </a:p>
         </p:txBody>
       </p:sp>
@@ -8022,13 +8008,6 @@
               </a:rPr>
               <a:t>2 000</a:t>
             </a:r>
-            <a:endParaRPr lang="en-US" b="1" dirty="0" smtClean="0">
-              <a:solidFill>
-                <a:schemeClr val="tx1"/>
-              </a:solidFill>
-              <a:latin typeface="Calibri Light" panose="020F0302020204030204" pitchFamily="34" charset="0"/>
-              <a:cs typeface="Calibri Light" panose="020F0302020204030204" pitchFamily="34" charset="0"/>
-            </a:endParaRPr>
           </a:p>
         </p:txBody>
       </p:sp>
@@ -8081,13 +8060,6 @@
               </a:rPr>
               <a:t>Price / day</a:t>
             </a:r>
-            <a:endParaRPr lang="en-US" sz="1200" b="1" dirty="0" smtClean="0">
-              <a:solidFill>
-                <a:schemeClr val="tx1"/>
-              </a:solidFill>
-              <a:latin typeface="Calibri Light" panose="020F0302020204030204" pitchFamily="34" charset="0"/>
-              <a:cs typeface="Calibri Light" panose="020F0302020204030204" pitchFamily="34" charset="0"/>
-            </a:endParaRPr>
           </a:p>
         </p:txBody>
       </p:sp>
@@ -8143,13 +8115,6 @@
               </a:rPr>
               <a:t>USD</a:t>
             </a:r>
-            <a:endParaRPr lang="en-US" b="1" dirty="0" smtClean="0">
-              <a:solidFill>
-                <a:schemeClr val="tx1"/>
-              </a:solidFill>
-              <a:latin typeface="Calibri Light" panose="020F0302020204030204" pitchFamily="34" charset="0"/>
-              <a:cs typeface="Calibri Light" panose="020F0302020204030204" pitchFamily="34" charset="0"/>
-            </a:endParaRPr>
           </a:p>
         </p:txBody>
       </p:sp>
@@ -8202,13 +8167,6 @@
               </a:rPr>
               <a:t>Currency</a:t>
             </a:r>
-            <a:endParaRPr lang="en-US" sz="1200" b="1" dirty="0" smtClean="0">
-              <a:solidFill>
-                <a:schemeClr val="tx1"/>
-              </a:solidFill>
-              <a:latin typeface="Calibri Light" panose="020F0302020204030204" pitchFamily="34" charset="0"/>
-              <a:cs typeface="Calibri Light" panose="020F0302020204030204" pitchFamily="34" charset="0"/>
-            </a:endParaRPr>
           </a:p>
         </p:txBody>
       </p:sp>
@@ -8319,13 +8277,6 @@
               </a:rPr>
               <a:t>100</a:t>
             </a:r>
-            <a:endParaRPr lang="en-US" b="1" dirty="0" smtClean="0">
-              <a:solidFill>
-                <a:schemeClr val="tx1"/>
-              </a:solidFill>
-              <a:latin typeface="Calibri Light" panose="020F0302020204030204" pitchFamily="34" charset="0"/>
-              <a:cs typeface="Calibri Light" panose="020F0302020204030204" pitchFamily="34" charset="0"/>
-            </a:endParaRPr>
           </a:p>
         </p:txBody>
       </p:sp>
@@ -8386,17 +8337,7 @@
                 <a:latin typeface="Calibri Light" panose="020F0302020204030204" pitchFamily="34" charset="0"/>
                 <a:cs typeface="Calibri Light" panose="020F0302020204030204" pitchFamily="34" charset="0"/>
               </a:rPr>
-              <a:t>extra charge</a:t>
-            </a:r>
-            <a:r>
-              <a:rPr lang="en-US" sz="1200" b="1" smtClean="0">
-                <a:solidFill>
-                  <a:schemeClr val="tx1"/>
-                </a:solidFill>
-                <a:latin typeface="Calibri Light" panose="020F0302020204030204" pitchFamily="34" charset="0"/>
-                <a:cs typeface="Calibri Light" panose="020F0302020204030204" pitchFamily="34" charset="0"/>
-              </a:rPr>
-              <a:t> </a:t>
+              <a:t>extra charge </a:t>
             </a:r>
             <a:r>
               <a:rPr lang="en-US" sz="1200" b="1" dirty="0" smtClean="0">
@@ -8408,13 +8349,6 @@
               </a:rPr>
               <a:t>/ day</a:t>
             </a:r>
-            <a:endParaRPr lang="en-US" sz="1200" b="1" dirty="0" smtClean="0">
-              <a:solidFill>
-                <a:schemeClr val="tx1"/>
-              </a:solidFill>
-              <a:latin typeface="Calibri Light" panose="020F0302020204030204" pitchFamily="34" charset="0"/>
-              <a:cs typeface="Calibri Light" panose="020F0302020204030204" pitchFamily="34" charset="0"/>
-            </a:endParaRPr>
           </a:p>
         </p:txBody>
       </p:sp>
@@ -9274,13 +9208,6 @@
               </a:rPr>
               <a:t>Rules</a:t>
             </a:r>
-            <a:endParaRPr lang="en-US" sz="1200" b="1" dirty="0" smtClean="0">
-              <a:solidFill>
-                <a:schemeClr val="tx1"/>
-              </a:solidFill>
-              <a:latin typeface="Calibri Light" panose="020F0302020204030204" pitchFamily="34" charset="0"/>
-              <a:cs typeface="Calibri Light" panose="020F0302020204030204" pitchFamily="34" charset="0"/>
-            </a:endParaRPr>
           </a:p>
         </p:txBody>
       </p:sp>
@@ -9608,106 +9535,6 @@
               <a:latin typeface="Calibri Light" panose="020F0302020204030204" pitchFamily="34" charset="0"/>
               <a:cs typeface="Calibri Light" panose="020F0302020204030204" pitchFamily="34" charset="0"/>
             </a:endParaRPr>
-          </a:p>
-        </p:txBody>
-      </p:sp>
-      <p:sp>
-        <p:nvSpPr>
-          <p:cNvPr id="3" name="Rectangle 2"/>
-          <p:cNvSpPr/>
-          <p:nvPr/>
-        </p:nvSpPr>
-        <p:spPr>
-          <a:xfrm>
-            <a:off x="8685652" y="1815620"/>
-            <a:ext cx="3013884" cy="4312698"/>
-          </a:xfrm>
-          <a:prstGeom prst="rect">
-            <a:avLst/>
-          </a:prstGeom>
-          <a:solidFill>
-            <a:schemeClr val="bg1">
-              <a:lumMod val="95000"/>
-            </a:schemeClr>
-          </a:solidFill>
-          <a:ln>
-            <a:noFill/>
-          </a:ln>
-        </p:spPr>
-        <p:style>
-          <a:lnRef idx="2">
-            <a:schemeClr val="accent1">
-              <a:shade val="50000"/>
-            </a:schemeClr>
-          </a:lnRef>
-          <a:fillRef idx="1">
-            <a:schemeClr val="accent1"/>
-          </a:fillRef>
-          <a:effectRef idx="0">
-            <a:schemeClr val="accent1"/>
-          </a:effectRef>
-          <a:fontRef idx="minor">
-            <a:schemeClr val="lt1"/>
-          </a:fontRef>
-        </p:style>
-        <p:txBody>
-          <a:bodyPr rtlCol="0" anchor="ctr"/>
-          <a:lstStyle/>
-          <a:p>
-            <a:pPr algn="ctr"/>
-            <a:endParaRPr lang="en-US" dirty="0"/>
-          </a:p>
-        </p:txBody>
-      </p:sp>
-      <p:sp>
-        <p:nvSpPr>
-          <p:cNvPr id="76" name="Rounded Rectangle 75"/>
-          <p:cNvSpPr/>
-          <p:nvPr/>
-        </p:nvSpPr>
-        <p:spPr>
-          <a:xfrm>
-            <a:off x="8813190" y="5628385"/>
-            <a:ext cx="1313534" cy="413220"/>
-          </a:xfrm>
-          <a:prstGeom prst="roundRect">
-            <a:avLst/>
-          </a:prstGeom>
-          <a:solidFill>
-            <a:schemeClr val="accent1">
-              <a:lumMod val="75000"/>
-            </a:schemeClr>
-          </a:solidFill>
-          <a:ln>
-            <a:noFill/>
-          </a:ln>
-        </p:spPr>
-        <p:style>
-          <a:lnRef idx="2">
-            <a:schemeClr val="accent1">
-              <a:shade val="50000"/>
-            </a:schemeClr>
-          </a:lnRef>
-          <a:fillRef idx="1">
-            <a:schemeClr val="accent1"/>
-          </a:fillRef>
-          <a:effectRef idx="0">
-            <a:schemeClr val="accent1"/>
-          </a:effectRef>
-          <a:fontRef idx="minor">
-            <a:schemeClr val="lt1"/>
-          </a:fontRef>
-        </p:style>
-        <p:txBody>
-          <a:bodyPr rtlCol="0" anchor="ctr"/>
-          <a:lstStyle/>
-          <a:p>
-            <a:pPr algn="ctr"/>
-            <a:r>
-              <a:rPr lang="en-US" sz="1600" dirty="0" smtClean="0"/>
-              <a:t>Accept</a:t>
-            </a:r>
-            <a:endParaRPr lang="en-US" sz="1600" dirty="0"/>
           </a:p>
         </p:txBody>
       </p:sp>
@@ -11192,13 +11019,1071 @@
       </p:pic>
       <p:sp>
         <p:nvSpPr>
+          <p:cNvPr id="3" name="Rectangle 2"/>
+          <p:cNvSpPr/>
+          <p:nvPr/>
+        </p:nvSpPr>
+        <p:spPr>
+          <a:xfrm>
+            <a:off x="8685652" y="1815620"/>
+            <a:ext cx="3013884" cy="4312698"/>
+          </a:xfrm>
+          <a:prstGeom prst="rect">
+            <a:avLst/>
+          </a:prstGeom>
+          <a:solidFill>
+            <a:schemeClr val="bg1">
+              <a:lumMod val="95000"/>
+            </a:schemeClr>
+          </a:solidFill>
+          <a:ln>
+            <a:noFill/>
+          </a:ln>
+        </p:spPr>
+        <p:style>
+          <a:lnRef idx="2">
+            <a:schemeClr val="accent1">
+              <a:shade val="50000"/>
+            </a:schemeClr>
+          </a:lnRef>
+          <a:fillRef idx="1">
+            <a:schemeClr val="accent1"/>
+          </a:fillRef>
+          <a:effectRef idx="0">
+            <a:schemeClr val="accent1"/>
+          </a:effectRef>
+          <a:fontRef idx="minor">
+            <a:schemeClr val="lt1"/>
+          </a:fontRef>
+        </p:style>
+        <p:txBody>
+          <a:bodyPr rtlCol="0" anchor="ctr"/>
+          <a:lstStyle/>
+          <a:p>
+            <a:pPr algn="ctr"/>
+            <a:endParaRPr lang="en-US" dirty="0"/>
+          </a:p>
+        </p:txBody>
+      </p:sp>
+      <p:cxnSp>
+        <p:nvCxnSpPr>
+          <p:cNvPr id="43" name="Straight Connector 42"/>
+          <p:cNvCxnSpPr/>
+          <p:nvPr/>
+        </p:nvCxnSpPr>
+        <p:spPr>
+          <a:xfrm>
+            <a:off x="8777401" y="3899367"/>
+            <a:ext cx="2812956" cy="0"/>
+          </a:xfrm>
+          <a:prstGeom prst="line">
+            <a:avLst/>
+          </a:prstGeom>
+          <a:ln>
+            <a:solidFill>
+              <a:schemeClr val="bg1">
+                <a:lumMod val="50000"/>
+              </a:schemeClr>
+            </a:solidFill>
+          </a:ln>
+        </p:spPr>
+        <p:style>
+          <a:lnRef idx="1">
+            <a:schemeClr val="accent1"/>
+          </a:lnRef>
+          <a:fillRef idx="0">
+            <a:schemeClr val="accent1"/>
+          </a:fillRef>
+          <a:effectRef idx="0">
+            <a:schemeClr val="accent1"/>
+          </a:effectRef>
+          <a:fontRef idx="minor">
+            <a:schemeClr val="tx1"/>
+          </a:fontRef>
+        </p:style>
+      </p:cxnSp>
+      <p:sp>
+        <p:nvSpPr>
+          <p:cNvPr id="44" name="Rectangle 43"/>
+          <p:cNvSpPr/>
+          <p:nvPr/>
+        </p:nvSpPr>
+        <p:spPr>
+          <a:xfrm>
+            <a:off x="8663639" y="2614928"/>
+            <a:ext cx="1098588" cy="258026"/>
+          </a:xfrm>
+          <a:prstGeom prst="rect">
+            <a:avLst/>
+          </a:prstGeom>
+          <a:noFill/>
+          <a:ln>
+            <a:noFill/>
+          </a:ln>
+        </p:spPr>
+        <p:style>
+          <a:lnRef idx="2">
+            <a:schemeClr val="accent1">
+              <a:shade val="50000"/>
+            </a:schemeClr>
+          </a:lnRef>
+          <a:fillRef idx="1">
+            <a:schemeClr val="accent1"/>
+          </a:fillRef>
+          <a:effectRef idx="0">
+            <a:schemeClr val="accent1"/>
+          </a:effectRef>
+          <a:fontRef idx="minor">
+            <a:schemeClr val="lt1"/>
+          </a:fontRef>
+        </p:style>
+        <p:txBody>
+          <a:bodyPr rtlCol="0" anchor="ctr"/>
+          <a:lstStyle/>
+          <a:p>
+            <a:r>
+              <a:rPr lang="en-US" sz="1200" dirty="0" smtClean="0">
+                <a:solidFill>
+                  <a:schemeClr val="tx1"/>
+                </a:solidFill>
+                <a:latin typeface="Calibri Light" panose="020F0302020204030204" pitchFamily="34" charset="0"/>
+                <a:cs typeface="Calibri Light" panose="020F0302020204030204" pitchFamily="34" charset="0"/>
+              </a:rPr>
+              <a:t>Where to take</a:t>
+            </a:r>
+          </a:p>
+        </p:txBody>
+      </p:sp>
+      <p:sp>
+        <p:nvSpPr>
+          <p:cNvPr id="52" name="Rectangle 51"/>
+          <p:cNvSpPr/>
+          <p:nvPr/>
+        </p:nvSpPr>
+        <p:spPr>
+          <a:xfrm>
+            <a:off x="10785496" y="2614928"/>
+            <a:ext cx="894288" cy="258026"/>
+          </a:xfrm>
+          <a:prstGeom prst="rect">
+            <a:avLst/>
+          </a:prstGeom>
+          <a:noFill/>
+          <a:ln>
+            <a:noFill/>
+          </a:ln>
+        </p:spPr>
+        <p:style>
+          <a:lnRef idx="2">
+            <a:schemeClr val="accent1">
+              <a:shade val="50000"/>
+            </a:schemeClr>
+          </a:lnRef>
+          <a:fillRef idx="1">
+            <a:schemeClr val="accent1"/>
+          </a:fillRef>
+          <a:effectRef idx="0">
+            <a:schemeClr val="accent1"/>
+          </a:effectRef>
+          <a:fontRef idx="minor">
+            <a:schemeClr val="lt1"/>
+          </a:fontRef>
+        </p:style>
+        <p:txBody>
+          <a:bodyPr rtlCol="0" anchor="ctr"/>
+          <a:lstStyle/>
+          <a:p>
+            <a:pPr algn="r"/>
+            <a:r>
+              <a:rPr lang="en-US" sz="1100" dirty="0" smtClean="0">
+                <a:solidFill>
+                  <a:schemeClr val="tx1"/>
+                </a:solidFill>
+                <a:latin typeface="Calibri Light" panose="020F0302020204030204" pitchFamily="34" charset="0"/>
+                <a:cs typeface="Calibri Light" panose="020F0302020204030204" pitchFamily="34" charset="0"/>
+              </a:rPr>
+              <a:t>Saigon</a:t>
+            </a:r>
+          </a:p>
+        </p:txBody>
+      </p:sp>
+      <p:sp>
+        <p:nvSpPr>
+          <p:cNvPr id="53" name="Rectangle 52"/>
+          <p:cNvSpPr/>
+          <p:nvPr/>
+        </p:nvSpPr>
+        <p:spPr>
+          <a:xfrm>
+            <a:off x="8663639" y="3238036"/>
+            <a:ext cx="894288" cy="258026"/>
+          </a:xfrm>
+          <a:prstGeom prst="rect">
+            <a:avLst/>
+          </a:prstGeom>
+          <a:noFill/>
+          <a:ln>
+            <a:noFill/>
+          </a:ln>
+        </p:spPr>
+        <p:style>
+          <a:lnRef idx="2">
+            <a:schemeClr val="accent1">
+              <a:shade val="50000"/>
+            </a:schemeClr>
+          </a:lnRef>
+          <a:fillRef idx="1">
+            <a:schemeClr val="accent1"/>
+          </a:fillRef>
+          <a:effectRef idx="0">
+            <a:schemeClr val="accent1"/>
+          </a:effectRef>
+          <a:fontRef idx="minor">
+            <a:schemeClr val="lt1"/>
+          </a:fontRef>
+        </p:style>
+        <p:txBody>
+          <a:bodyPr rtlCol="0" anchor="ctr"/>
+          <a:lstStyle/>
+          <a:p>
+            <a:r>
+              <a:rPr lang="en-US" sz="1100" dirty="0" smtClean="0">
+                <a:solidFill>
+                  <a:schemeClr val="tx1"/>
+                </a:solidFill>
+                <a:latin typeface="Calibri Light" panose="020F0302020204030204" pitchFamily="34" charset="0"/>
+                <a:cs typeface="Calibri Light" panose="020F0302020204030204" pitchFamily="34" charset="0"/>
+              </a:rPr>
+              <a:t>Duration</a:t>
+            </a:r>
+          </a:p>
+        </p:txBody>
+      </p:sp>
+      <p:sp>
+        <p:nvSpPr>
+          <p:cNvPr id="54" name="Rectangle 53"/>
+          <p:cNvSpPr/>
+          <p:nvPr/>
+        </p:nvSpPr>
+        <p:spPr>
+          <a:xfrm>
+            <a:off x="10372280" y="3238036"/>
+            <a:ext cx="1307504" cy="258026"/>
+          </a:xfrm>
+          <a:prstGeom prst="rect">
+            <a:avLst/>
+          </a:prstGeom>
+          <a:noFill/>
+          <a:ln>
+            <a:noFill/>
+          </a:ln>
+        </p:spPr>
+        <p:style>
+          <a:lnRef idx="2">
+            <a:schemeClr val="accent1">
+              <a:shade val="50000"/>
+            </a:schemeClr>
+          </a:lnRef>
+          <a:fillRef idx="1">
+            <a:schemeClr val="accent1"/>
+          </a:fillRef>
+          <a:effectRef idx="0">
+            <a:schemeClr val="accent1"/>
+          </a:effectRef>
+          <a:fontRef idx="minor">
+            <a:schemeClr val="lt1"/>
+          </a:fontRef>
+        </p:style>
+        <p:txBody>
+          <a:bodyPr rtlCol="0" anchor="ctr"/>
+          <a:lstStyle/>
+          <a:p>
+            <a:pPr algn="r"/>
+            <a:r>
+              <a:rPr lang="en-US" sz="1100" dirty="0" smtClean="0">
+                <a:solidFill>
+                  <a:schemeClr val="tx1"/>
+                </a:solidFill>
+                <a:latin typeface="Calibri Light" panose="020F0302020204030204" pitchFamily="34" charset="0"/>
+                <a:cs typeface="Calibri Light" panose="020F0302020204030204" pitchFamily="34" charset="0"/>
+              </a:rPr>
+              <a:t>2000$ x 2 day(s)</a:t>
+            </a:r>
+          </a:p>
+        </p:txBody>
+      </p:sp>
+      <p:sp>
+        <p:nvSpPr>
+          <p:cNvPr id="56" name="Rounded Rectangle 55"/>
+          <p:cNvSpPr/>
+          <p:nvPr/>
+        </p:nvSpPr>
+        <p:spPr>
+          <a:xfrm>
+            <a:off x="8861323" y="2179764"/>
+            <a:ext cx="1245649" cy="300898"/>
+          </a:xfrm>
+          <a:prstGeom prst="roundRect">
+            <a:avLst/>
+          </a:prstGeom>
+          <a:solidFill>
+            <a:schemeClr val="bg1"/>
+          </a:solidFill>
+          <a:ln>
+            <a:noFill/>
+          </a:ln>
+        </p:spPr>
+        <p:style>
+          <a:lnRef idx="2">
+            <a:schemeClr val="accent1">
+              <a:shade val="50000"/>
+            </a:schemeClr>
+          </a:lnRef>
+          <a:fillRef idx="1">
+            <a:schemeClr val="accent1"/>
+          </a:fillRef>
+          <a:effectRef idx="0">
+            <a:schemeClr val="accent1"/>
+          </a:effectRef>
+          <a:fontRef idx="minor">
+            <a:schemeClr val="lt1"/>
+          </a:fontRef>
+        </p:style>
+        <p:txBody>
+          <a:bodyPr rtlCol="0" anchor="ctr"/>
+          <a:lstStyle/>
+          <a:p>
+            <a:r>
+              <a:rPr lang="en-US" sz="1200" dirty="0" smtClean="0">
+                <a:solidFill>
+                  <a:schemeClr val="bg1">
+                    <a:lumMod val="50000"/>
+                  </a:schemeClr>
+                </a:solidFill>
+                <a:latin typeface="+mj-lt"/>
+              </a:rPr>
+              <a:t>16-Nov-2016</a:t>
+            </a:r>
+            <a:endParaRPr lang="en-US" sz="1400" dirty="0">
+              <a:solidFill>
+                <a:schemeClr val="bg1">
+                  <a:lumMod val="50000"/>
+                </a:schemeClr>
+              </a:solidFill>
+              <a:latin typeface="+mj-lt"/>
+            </a:endParaRPr>
+          </a:p>
+        </p:txBody>
+      </p:sp>
+      <p:sp>
+        <p:nvSpPr>
+          <p:cNvPr id="57" name="Rounded Rectangle 56"/>
+          <p:cNvSpPr/>
+          <p:nvPr/>
+        </p:nvSpPr>
+        <p:spPr>
+          <a:xfrm>
+            <a:off x="10253896" y="2179764"/>
+            <a:ext cx="1245649" cy="300898"/>
+          </a:xfrm>
+          <a:prstGeom prst="roundRect">
+            <a:avLst/>
+          </a:prstGeom>
+          <a:solidFill>
+            <a:schemeClr val="bg1"/>
+          </a:solidFill>
+          <a:ln>
+            <a:noFill/>
+          </a:ln>
+        </p:spPr>
+        <p:style>
+          <a:lnRef idx="2">
+            <a:schemeClr val="accent1">
+              <a:shade val="50000"/>
+            </a:schemeClr>
+          </a:lnRef>
+          <a:fillRef idx="1">
+            <a:schemeClr val="accent1"/>
+          </a:fillRef>
+          <a:effectRef idx="0">
+            <a:schemeClr val="accent1"/>
+          </a:effectRef>
+          <a:fontRef idx="minor">
+            <a:schemeClr val="lt1"/>
+          </a:fontRef>
+        </p:style>
+        <p:txBody>
+          <a:bodyPr rtlCol="0" anchor="ctr"/>
+          <a:lstStyle/>
+          <a:p>
+            <a:r>
+              <a:rPr lang="en-US" sz="1200" dirty="0" smtClean="0">
+                <a:solidFill>
+                  <a:schemeClr val="bg1">
+                    <a:lumMod val="50000"/>
+                  </a:schemeClr>
+                </a:solidFill>
+                <a:latin typeface="+mj-lt"/>
+              </a:rPr>
+              <a:t>17-Nov-2016</a:t>
+            </a:r>
+            <a:endParaRPr lang="en-US" sz="1200" dirty="0">
+              <a:solidFill>
+                <a:schemeClr val="bg1">
+                  <a:lumMod val="50000"/>
+                </a:schemeClr>
+              </a:solidFill>
+              <a:latin typeface="+mj-lt"/>
+            </a:endParaRPr>
+          </a:p>
+        </p:txBody>
+      </p:sp>
+      <p:pic>
+        <p:nvPicPr>
+          <p:cNvPr id="58" name="Picture 57"/>
+          <p:cNvPicPr>
+            <a:picLocks noChangeAspect="1"/>
+          </p:cNvPicPr>
+          <p:nvPr/>
+        </p:nvPicPr>
+        <p:blipFill>
+          <a:blip r:embed="rId3" cstate="print">
+            <a:extLst>
+              <a:ext uri="{28A0092B-C50C-407E-A947-70E740481C1C}">
+                <a14:useLocalDpi xmlns:a14="http://schemas.microsoft.com/office/drawing/2010/main" val="0"/>
+              </a:ext>
+            </a:extLst>
+          </a:blip>
+          <a:stretch>
+            <a:fillRect/>
+          </a:stretch>
+        </p:blipFill>
+        <p:spPr>
+          <a:xfrm>
+            <a:off x="9873167" y="2228509"/>
+            <a:ext cx="203408" cy="203408"/>
+          </a:xfrm>
+          <a:prstGeom prst="rect">
+            <a:avLst/>
+          </a:prstGeom>
+        </p:spPr>
+      </p:pic>
+      <p:pic>
+        <p:nvPicPr>
+          <p:cNvPr id="61" name="Picture 60"/>
+          <p:cNvPicPr>
+            <a:picLocks noChangeAspect="1"/>
+          </p:cNvPicPr>
+          <p:nvPr/>
+        </p:nvPicPr>
+        <p:blipFill>
+          <a:blip r:embed="rId3" cstate="print">
+            <a:extLst>
+              <a:ext uri="{28A0092B-C50C-407E-A947-70E740481C1C}">
+                <a14:useLocalDpi xmlns:a14="http://schemas.microsoft.com/office/drawing/2010/main" val="0"/>
+              </a:ext>
+            </a:extLst>
+          </a:blip>
+          <a:stretch>
+            <a:fillRect/>
+          </a:stretch>
+        </p:blipFill>
+        <p:spPr>
+          <a:xfrm>
+            <a:off x="11265740" y="2213154"/>
+            <a:ext cx="203408" cy="203408"/>
+          </a:xfrm>
+          <a:prstGeom prst="rect">
+            <a:avLst/>
+          </a:prstGeom>
+        </p:spPr>
+      </p:pic>
+      <p:sp>
+        <p:nvSpPr>
+          <p:cNvPr id="65" name="Rectangle 64"/>
+          <p:cNvSpPr/>
+          <p:nvPr/>
+        </p:nvSpPr>
+        <p:spPr>
+          <a:xfrm>
+            <a:off x="8861322" y="1844670"/>
+            <a:ext cx="1245649" cy="286349"/>
+          </a:xfrm>
+          <a:prstGeom prst="rect">
+            <a:avLst/>
+          </a:prstGeom>
+          <a:noFill/>
+          <a:ln>
+            <a:noFill/>
+          </a:ln>
+        </p:spPr>
+        <p:style>
+          <a:lnRef idx="2">
+            <a:schemeClr val="accent1">
+              <a:shade val="50000"/>
+            </a:schemeClr>
+          </a:lnRef>
+          <a:fillRef idx="1">
+            <a:schemeClr val="accent1"/>
+          </a:fillRef>
+          <a:effectRef idx="0">
+            <a:schemeClr val="accent1"/>
+          </a:effectRef>
+          <a:fontRef idx="minor">
+            <a:schemeClr val="lt1"/>
+          </a:fontRef>
+        </p:style>
+        <p:txBody>
+          <a:bodyPr rtlCol="0" anchor="ctr"/>
+          <a:lstStyle/>
+          <a:p>
+            <a:r>
+              <a:rPr lang="en-US" sz="1200" dirty="0" smtClean="0">
+                <a:solidFill>
+                  <a:schemeClr val="tx1"/>
+                </a:solidFill>
+                <a:latin typeface="Calibri Light" panose="020F0302020204030204" pitchFamily="34" charset="0"/>
+                <a:cs typeface="Calibri Light" panose="020F0302020204030204" pitchFamily="34" charset="0"/>
+              </a:rPr>
+              <a:t>Start day</a:t>
+            </a:r>
+          </a:p>
+        </p:txBody>
+      </p:sp>
+      <p:sp>
+        <p:nvSpPr>
+          <p:cNvPr id="66" name="Rectangle 65"/>
+          <p:cNvSpPr/>
+          <p:nvPr/>
+        </p:nvSpPr>
+        <p:spPr>
+          <a:xfrm>
+            <a:off x="10270553" y="1844670"/>
+            <a:ext cx="1245649" cy="286349"/>
+          </a:xfrm>
+          <a:prstGeom prst="rect">
+            <a:avLst/>
+          </a:prstGeom>
+          <a:noFill/>
+          <a:ln>
+            <a:noFill/>
+          </a:ln>
+        </p:spPr>
+        <p:style>
+          <a:lnRef idx="2">
+            <a:schemeClr val="accent1">
+              <a:shade val="50000"/>
+            </a:schemeClr>
+          </a:lnRef>
+          <a:fillRef idx="1">
+            <a:schemeClr val="accent1"/>
+          </a:fillRef>
+          <a:effectRef idx="0">
+            <a:schemeClr val="accent1"/>
+          </a:effectRef>
+          <a:fontRef idx="minor">
+            <a:schemeClr val="lt1"/>
+          </a:fontRef>
+        </p:style>
+        <p:txBody>
+          <a:bodyPr rtlCol="0" anchor="ctr"/>
+          <a:lstStyle/>
+          <a:p>
+            <a:r>
+              <a:rPr lang="en-US" sz="1200" dirty="0" smtClean="0">
+                <a:solidFill>
+                  <a:schemeClr val="tx1"/>
+                </a:solidFill>
+                <a:latin typeface="Calibri Light" panose="020F0302020204030204" pitchFamily="34" charset="0"/>
+                <a:cs typeface="Calibri Light" panose="020F0302020204030204" pitchFamily="34" charset="0"/>
+              </a:rPr>
+              <a:t>End day</a:t>
+            </a:r>
+          </a:p>
+        </p:txBody>
+      </p:sp>
+      <p:sp>
+        <p:nvSpPr>
+          <p:cNvPr id="67" name="Rectangle 66"/>
+          <p:cNvSpPr/>
+          <p:nvPr/>
+        </p:nvSpPr>
+        <p:spPr>
+          <a:xfrm>
+            <a:off x="8663639" y="3990984"/>
+            <a:ext cx="894288" cy="258026"/>
+          </a:xfrm>
+          <a:prstGeom prst="rect">
+            <a:avLst/>
+          </a:prstGeom>
+          <a:noFill/>
+          <a:ln>
+            <a:noFill/>
+          </a:ln>
+        </p:spPr>
+        <p:style>
+          <a:lnRef idx="2">
+            <a:schemeClr val="accent1">
+              <a:shade val="50000"/>
+            </a:schemeClr>
+          </a:lnRef>
+          <a:fillRef idx="1">
+            <a:schemeClr val="accent1"/>
+          </a:fillRef>
+          <a:effectRef idx="0">
+            <a:schemeClr val="accent1"/>
+          </a:effectRef>
+          <a:fontRef idx="minor">
+            <a:schemeClr val="lt1"/>
+          </a:fontRef>
+        </p:style>
+        <p:txBody>
+          <a:bodyPr rtlCol="0" anchor="ctr"/>
+          <a:lstStyle/>
+          <a:p>
+            <a:r>
+              <a:rPr lang="en-US" sz="1100" b="1" dirty="0" smtClean="0">
+                <a:solidFill>
+                  <a:schemeClr val="tx1"/>
+                </a:solidFill>
+                <a:latin typeface="Calibri Light" panose="020F0302020204030204" pitchFamily="34" charset="0"/>
+                <a:cs typeface="Calibri Light" panose="020F0302020204030204" pitchFamily="34" charset="0"/>
+              </a:rPr>
+              <a:t>Final Price</a:t>
+            </a:r>
+          </a:p>
+        </p:txBody>
+      </p:sp>
+      <p:sp>
+        <p:nvSpPr>
+          <p:cNvPr id="68" name="Rectangle 67"/>
+          <p:cNvSpPr/>
+          <p:nvPr/>
+        </p:nvSpPr>
+        <p:spPr>
+          <a:xfrm>
+            <a:off x="10785496" y="3990984"/>
+            <a:ext cx="894288" cy="258026"/>
+          </a:xfrm>
+          <a:prstGeom prst="rect">
+            <a:avLst/>
+          </a:prstGeom>
+          <a:noFill/>
+          <a:ln>
+            <a:noFill/>
+          </a:ln>
+        </p:spPr>
+        <p:style>
+          <a:lnRef idx="2">
+            <a:schemeClr val="accent1">
+              <a:shade val="50000"/>
+            </a:schemeClr>
+          </a:lnRef>
+          <a:fillRef idx="1">
+            <a:schemeClr val="accent1"/>
+          </a:fillRef>
+          <a:effectRef idx="0">
+            <a:schemeClr val="accent1"/>
+          </a:effectRef>
+          <a:fontRef idx="minor">
+            <a:schemeClr val="lt1"/>
+          </a:fontRef>
+        </p:style>
+        <p:txBody>
+          <a:bodyPr rtlCol="0" anchor="ctr"/>
+          <a:lstStyle/>
+          <a:p>
+            <a:pPr algn="r"/>
+            <a:r>
+              <a:rPr lang="en-US" sz="1100" b="1" dirty="0">
+                <a:solidFill>
+                  <a:schemeClr val="tx1"/>
+                </a:solidFill>
+                <a:latin typeface="Calibri Light" panose="020F0302020204030204" pitchFamily="34" charset="0"/>
+                <a:cs typeface="Calibri Light" panose="020F0302020204030204" pitchFamily="34" charset="0"/>
+              </a:rPr>
+              <a:t>4</a:t>
+            </a:r>
+            <a:r>
+              <a:rPr lang="en-US" sz="1100" b="1" dirty="0" smtClean="0">
+                <a:solidFill>
+                  <a:schemeClr val="tx1"/>
+                </a:solidFill>
+                <a:latin typeface="Calibri Light" panose="020F0302020204030204" pitchFamily="34" charset="0"/>
+                <a:cs typeface="Calibri Light" panose="020F0302020204030204" pitchFamily="34" charset="0"/>
+              </a:rPr>
+              <a:t>000 $</a:t>
+            </a:r>
+          </a:p>
+        </p:txBody>
+      </p:sp>
+      <p:sp>
+        <p:nvSpPr>
+          <p:cNvPr id="69" name="Rectangle 68"/>
+          <p:cNvSpPr/>
+          <p:nvPr/>
+        </p:nvSpPr>
+        <p:spPr>
+          <a:xfrm>
+            <a:off x="8663639" y="3561524"/>
+            <a:ext cx="1606914" cy="246227"/>
+          </a:xfrm>
+          <a:prstGeom prst="rect">
+            <a:avLst/>
+          </a:prstGeom>
+          <a:noFill/>
+          <a:ln>
+            <a:noFill/>
+          </a:ln>
+        </p:spPr>
+        <p:style>
+          <a:lnRef idx="2">
+            <a:schemeClr val="accent1">
+              <a:shade val="50000"/>
+            </a:schemeClr>
+          </a:lnRef>
+          <a:fillRef idx="1">
+            <a:schemeClr val="accent1"/>
+          </a:fillRef>
+          <a:effectRef idx="0">
+            <a:schemeClr val="accent1"/>
+          </a:effectRef>
+          <a:fontRef idx="minor">
+            <a:schemeClr val="lt1"/>
+          </a:fontRef>
+        </p:style>
+        <p:txBody>
+          <a:bodyPr rtlCol="0" anchor="ctr"/>
+          <a:lstStyle/>
+          <a:p>
+            <a:r>
+              <a:rPr lang="en-US" sz="1100" dirty="0" smtClean="0">
+                <a:solidFill>
+                  <a:schemeClr val="tx1"/>
+                </a:solidFill>
+                <a:latin typeface="Calibri Light" panose="020F0302020204030204" pitchFamily="34" charset="0"/>
+                <a:cs typeface="Calibri Light" panose="020F0302020204030204" pitchFamily="34" charset="0"/>
+              </a:rPr>
+              <a:t>Additional </a:t>
+            </a:r>
+            <a:r>
+              <a:rPr lang="en-US" sz="1100" smtClean="0">
+                <a:solidFill>
+                  <a:schemeClr val="tx1"/>
+                </a:solidFill>
+                <a:latin typeface="Calibri Light" panose="020F0302020204030204" pitchFamily="34" charset="0"/>
+                <a:cs typeface="Calibri Light" panose="020F0302020204030204" pitchFamily="34" charset="0"/>
+              </a:rPr>
+              <a:t>travel charge</a:t>
+            </a:r>
+            <a:endParaRPr lang="en-US" sz="1100" dirty="0" smtClean="0">
+              <a:solidFill>
+                <a:schemeClr val="tx1"/>
+              </a:solidFill>
+              <a:latin typeface="Calibri Light" panose="020F0302020204030204" pitchFamily="34" charset="0"/>
+              <a:cs typeface="Calibri Light" panose="020F0302020204030204" pitchFamily="34" charset="0"/>
+            </a:endParaRPr>
+          </a:p>
+        </p:txBody>
+      </p:sp>
+      <p:sp>
+        <p:nvSpPr>
+          <p:cNvPr id="70" name="Rectangle 69"/>
+          <p:cNvSpPr/>
+          <p:nvPr/>
+        </p:nvSpPr>
+        <p:spPr>
+          <a:xfrm>
+            <a:off x="10495848" y="3561524"/>
+            <a:ext cx="1183936" cy="246227"/>
+          </a:xfrm>
+          <a:prstGeom prst="rect">
+            <a:avLst/>
+          </a:prstGeom>
+          <a:noFill/>
+          <a:ln>
+            <a:noFill/>
+          </a:ln>
+        </p:spPr>
+        <p:style>
+          <a:lnRef idx="2">
+            <a:schemeClr val="accent1">
+              <a:shade val="50000"/>
+            </a:schemeClr>
+          </a:lnRef>
+          <a:fillRef idx="1">
+            <a:schemeClr val="accent1"/>
+          </a:fillRef>
+          <a:effectRef idx="0">
+            <a:schemeClr val="accent1"/>
+          </a:effectRef>
+          <a:fontRef idx="minor">
+            <a:schemeClr val="lt1"/>
+          </a:fontRef>
+        </p:style>
+        <p:txBody>
+          <a:bodyPr rtlCol="0" anchor="ctr"/>
+          <a:lstStyle/>
+          <a:p>
+            <a:pPr algn="r"/>
+            <a:r>
+              <a:rPr lang="en-US" sz="1100" dirty="0" smtClean="0">
+                <a:solidFill>
+                  <a:schemeClr val="tx1"/>
+                </a:solidFill>
+                <a:latin typeface="Calibri Light" panose="020F0302020204030204" pitchFamily="34" charset="0"/>
+                <a:cs typeface="Calibri Light" panose="020F0302020204030204" pitchFamily="34" charset="0"/>
+              </a:rPr>
+              <a:t>100$ x </a:t>
+            </a:r>
+            <a:r>
+              <a:rPr lang="en-US" sz="1100" smtClean="0">
+                <a:solidFill>
+                  <a:schemeClr val="tx1"/>
+                </a:solidFill>
+                <a:latin typeface="Calibri Light" panose="020F0302020204030204" pitchFamily="34" charset="0"/>
+                <a:cs typeface="Calibri Light" panose="020F0302020204030204" pitchFamily="34" charset="0"/>
+              </a:rPr>
+              <a:t>0 day(s)</a:t>
+            </a:r>
+            <a:endParaRPr lang="en-US" sz="1100" dirty="0" smtClean="0">
+              <a:solidFill>
+                <a:schemeClr val="tx1"/>
+              </a:solidFill>
+              <a:latin typeface="Calibri Light" panose="020F0302020204030204" pitchFamily="34" charset="0"/>
+              <a:cs typeface="Calibri Light" panose="020F0302020204030204" pitchFamily="34" charset="0"/>
+            </a:endParaRPr>
+          </a:p>
+        </p:txBody>
+      </p:sp>
+      <p:sp>
+        <p:nvSpPr>
+          <p:cNvPr id="71" name="Rectangle 70"/>
+          <p:cNvSpPr/>
+          <p:nvPr/>
+        </p:nvSpPr>
+        <p:spPr>
+          <a:xfrm>
+            <a:off x="8646982" y="4245877"/>
+            <a:ext cx="1606914" cy="246227"/>
+          </a:xfrm>
+          <a:prstGeom prst="rect">
+            <a:avLst/>
+          </a:prstGeom>
+          <a:noFill/>
+          <a:ln>
+            <a:noFill/>
+          </a:ln>
+        </p:spPr>
+        <p:style>
+          <a:lnRef idx="2">
+            <a:schemeClr val="accent1">
+              <a:shade val="50000"/>
+            </a:schemeClr>
+          </a:lnRef>
+          <a:fillRef idx="1">
+            <a:schemeClr val="accent1"/>
+          </a:fillRef>
+          <a:effectRef idx="0">
+            <a:schemeClr val="accent1"/>
+          </a:effectRef>
+          <a:fontRef idx="minor">
+            <a:schemeClr val="lt1"/>
+          </a:fontRef>
+        </p:style>
+        <p:txBody>
+          <a:bodyPr rtlCol="0" anchor="ctr"/>
+          <a:lstStyle/>
+          <a:p>
+            <a:r>
+              <a:rPr lang="en-US" sz="1100" dirty="0" smtClean="0">
+                <a:solidFill>
+                  <a:schemeClr val="tx1"/>
+                </a:solidFill>
+                <a:latin typeface="Calibri Light" panose="020F0302020204030204" pitchFamily="34" charset="0"/>
+                <a:cs typeface="Calibri Light" panose="020F0302020204030204" pitchFamily="34" charset="0"/>
+              </a:rPr>
+              <a:t>* </a:t>
+            </a:r>
+            <a:r>
+              <a:rPr lang="en-US" sz="1100" i="1" dirty="0" smtClean="0">
+                <a:solidFill>
+                  <a:schemeClr val="tx1"/>
+                </a:solidFill>
+                <a:latin typeface="Calibri Light" panose="020F0302020204030204" pitchFamily="34" charset="0"/>
+                <a:cs typeface="Calibri Light" panose="020F0302020204030204" pitchFamily="34" charset="0"/>
+              </a:rPr>
+              <a:t>Included tax</a:t>
+            </a:r>
+          </a:p>
+        </p:txBody>
+      </p:sp>
+      <p:sp>
+        <p:nvSpPr>
+          <p:cNvPr id="72" name="Rectangle 71"/>
+          <p:cNvSpPr/>
+          <p:nvPr/>
+        </p:nvSpPr>
+        <p:spPr>
+          <a:xfrm>
+            <a:off x="8663639" y="2927558"/>
+            <a:ext cx="1098588" cy="258026"/>
+          </a:xfrm>
+          <a:prstGeom prst="rect">
+            <a:avLst/>
+          </a:prstGeom>
+          <a:noFill/>
+          <a:ln>
+            <a:noFill/>
+          </a:ln>
+        </p:spPr>
+        <p:style>
+          <a:lnRef idx="2">
+            <a:schemeClr val="accent1">
+              <a:shade val="50000"/>
+            </a:schemeClr>
+          </a:lnRef>
+          <a:fillRef idx="1">
+            <a:schemeClr val="accent1"/>
+          </a:fillRef>
+          <a:effectRef idx="0">
+            <a:schemeClr val="accent1"/>
+          </a:effectRef>
+          <a:fontRef idx="minor">
+            <a:schemeClr val="lt1"/>
+          </a:fontRef>
+        </p:style>
+        <p:txBody>
+          <a:bodyPr rtlCol="0" anchor="ctr"/>
+          <a:lstStyle/>
+          <a:p>
+            <a:r>
+              <a:rPr lang="en-US" sz="1200" dirty="0" smtClean="0">
+                <a:solidFill>
+                  <a:schemeClr val="tx1"/>
+                </a:solidFill>
+                <a:latin typeface="Calibri Light" panose="020F0302020204030204" pitchFamily="34" charset="0"/>
+                <a:cs typeface="Calibri Light" panose="020F0302020204030204" pitchFamily="34" charset="0"/>
+              </a:rPr>
+              <a:t>Category</a:t>
+            </a:r>
+          </a:p>
+        </p:txBody>
+      </p:sp>
+      <p:sp>
+        <p:nvSpPr>
+          <p:cNvPr id="73" name="Rectangle 72"/>
+          <p:cNvSpPr/>
+          <p:nvPr/>
+        </p:nvSpPr>
+        <p:spPr>
+          <a:xfrm>
+            <a:off x="10785496" y="2927558"/>
+            <a:ext cx="894288" cy="258026"/>
+          </a:xfrm>
+          <a:prstGeom prst="rect">
+            <a:avLst/>
+          </a:prstGeom>
+          <a:noFill/>
+          <a:ln>
+            <a:noFill/>
+          </a:ln>
+        </p:spPr>
+        <p:style>
+          <a:lnRef idx="2">
+            <a:schemeClr val="accent1">
+              <a:shade val="50000"/>
+            </a:schemeClr>
+          </a:lnRef>
+          <a:fillRef idx="1">
+            <a:schemeClr val="accent1"/>
+          </a:fillRef>
+          <a:effectRef idx="0">
+            <a:schemeClr val="accent1"/>
+          </a:effectRef>
+          <a:fontRef idx="minor">
+            <a:schemeClr val="lt1"/>
+          </a:fontRef>
+        </p:style>
+        <p:txBody>
+          <a:bodyPr rtlCol="0" anchor="ctr"/>
+          <a:lstStyle/>
+          <a:p>
+            <a:pPr algn="r"/>
+            <a:r>
+              <a:rPr lang="en-US" sz="1100" dirty="0" smtClean="0">
+                <a:solidFill>
+                  <a:schemeClr val="tx1"/>
+                </a:solidFill>
+                <a:latin typeface="Calibri Light" panose="020F0302020204030204" pitchFamily="34" charset="0"/>
+                <a:cs typeface="Calibri Light" panose="020F0302020204030204" pitchFamily="34" charset="0"/>
+              </a:rPr>
+              <a:t>Wedding</a:t>
+            </a:r>
+          </a:p>
+        </p:txBody>
+      </p:sp>
+      <p:sp>
+        <p:nvSpPr>
+          <p:cNvPr id="76" name="Rounded Rectangle 75"/>
+          <p:cNvSpPr/>
+          <p:nvPr/>
+        </p:nvSpPr>
+        <p:spPr>
+          <a:xfrm>
+            <a:off x="8810724" y="5584763"/>
+            <a:ext cx="1313534" cy="413220"/>
+          </a:xfrm>
+          <a:prstGeom prst="roundRect">
+            <a:avLst/>
+          </a:prstGeom>
+          <a:solidFill>
+            <a:schemeClr val="accent1">
+              <a:lumMod val="75000"/>
+            </a:schemeClr>
+          </a:solidFill>
+          <a:ln>
+            <a:noFill/>
+          </a:ln>
+        </p:spPr>
+        <p:style>
+          <a:lnRef idx="2">
+            <a:schemeClr val="accent1">
+              <a:shade val="50000"/>
+            </a:schemeClr>
+          </a:lnRef>
+          <a:fillRef idx="1">
+            <a:schemeClr val="accent1"/>
+          </a:fillRef>
+          <a:effectRef idx="0">
+            <a:schemeClr val="accent1"/>
+          </a:effectRef>
+          <a:fontRef idx="minor">
+            <a:schemeClr val="lt1"/>
+          </a:fontRef>
+        </p:style>
+        <p:txBody>
+          <a:bodyPr rtlCol="0" anchor="ctr"/>
+          <a:lstStyle/>
+          <a:p>
+            <a:pPr algn="ctr"/>
+            <a:r>
+              <a:rPr lang="en-US" sz="1600" dirty="0" smtClean="0"/>
+              <a:t>Accept</a:t>
+            </a:r>
+            <a:endParaRPr lang="en-US" sz="1600" dirty="0"/>
+          </a:p>
+        </p:txBody>
+      </p:sp>
+      <p:sp>
+        <p:nvSpPr>
           <p:cNvPr id="51" name="Rounded Rectangle 50"/>
           <p:cNvSpPr/>
           <p:nvPr/>
         </p:nvSpPr>
         <p:spPr>
           <a:xfrm>
-            <a:off x="10256362" y="5621111"/>
+            <a:off x="10253896" y="5577489"/>
             <a:ext cx="1313534" cy="413220"/>
           </a:xfrm>
           <a:prstGeom prst="roundRect">
@@ -12622,17 +13507,7 @@
                 <a:latin typeface="Calibri Light" panose="020F0302020204030204" pitchFamily="34" charset="0"/>
                 <a:cs typeface="Calibri Light" panose="020F0302020204030204" pitchFamily="34" charset="0"/>
               </a:rPr>
-              <a:t> </a:t>
-            </a:r>
-            <a:r>
-              <a:rPr lang="en-US" b="1" dirty="0" smtClean="0">
-                <a:solidFill>
-                  <a:schemeClr val="tx1"/>
-                </a:solidFill>
-                <a:latin typeface="Calibri Light" panose="020F0302020204030204" pitchFamily="34" charset="0"/>
-                <a:cs typeface="Calibri Light" panose="020F0302020204030204" pitchFamily="34" charset="0"/>
-              </a:rPr>
-              <a:t>– </a:t>
+              <a:t> – </a:t>
             </a:r>
             <a:r>
               <a:rPr lang="en-US" b="1" dirty="0" err="1" smtClean="0">
@@ -15766,17 +16641,7 @@
                 <a:latin typeface="Calibri Light" panose="020F0302020204030204" pitchFamily="34" charset="0"/>
                 <a:cs typeface="Calibri Light" panose="020F0302020204030204" pitchFamily="34" charset="0"/>
               </a:rPr>
-              <a:t> </a:t>
-            </a:r>
-            <a:r>
-              <a:rPr lang="en-US" b="1" dirty="0" smtClean="0">
-                <a:solidFill>
-                  <a:schemeClr val="tx1"/>
-                </a:solidFill>
-                <a:latin typeface="Calibri Light" panose="020F0302020204030204" pitchFamily="34" charset="0"/>
-                <a:cs typeface="Calibri Light" panose="020F0302020204030204" pitchFamily="34" charset="0"/>
-              </a:rPr>
-              <a:t>– </a:t>
+              <a:t> – </a:t>
             </a:r>
             <a:r>
               <a:rPr lang="en-US" b="1" dirty="0" err="1" smtClean="0">
@@ -17279,13 +18144,6 @@
               </a:rPr>
               <a:t>Title</a:t>
             </a:r>
-            <a:endParaRPr lang="en-US" sz="1200" b="1" dirty="0" smtClean="0">
-              <a:solidFill>
-                <a:schemeClr val="tx1"/>
-              </a:solidFill>
-              <a:latin typeface="Calibri Light" panose="020F0302020204030204" pitchFamily="34" charset="0"/>
-              <a:cs typeface="Calibri Light" panose="020F0302020204030204" pitchFamily="34" charset="0"/>
-            </a:endParaRPr>
           </a:p>
         </p:txBody>
       </p:sp>
@@ -17338,13 +18196,6 @@
               </a:rPr>
               <a:t>Description</a:t>
             </a:r>
-            <a:endParaRPr lang="en-US" sz="1200" b="1" dirty="0" smtClean="0">
-              <a:solidFill>
-                <a:schemeClr val="tx1"/>
-              </a:solidFill>
-              <a:latin typeface="Calibri Light" panose="020F0302020204030204" pitchFamily="34" charset="0"/>
-              <a:cs typeface="Calibri Light" panose="020F0302020204030204" pitchFamily="34" charset="0"/>
-            </a:endParaRPr>
           </a:p>
         </p:txBody>
       </p:sp>
@@ -18546,13 +19397,6 @@
               </a:rPr>
               <a:t>Interior</a:t>
             </a:r>
-            <a:endParaRPr lang="en-US" sz="1600" b="1" dirty="0" smtClean="0">
-              <a:solidFill>
-                <a:schemeClr val="tx1"/>
-              </a:solidFill>
-              <a:latin typeface="Calibri Light" panose="020F0302020204030204" pitchFamily="34" charset="0"/>
-              <a:cs typeface="Calibri Light" panose="020F0302020204030204" pitchFamily="34" charset="0"/>
-            </a:endParaRPr>
           </a:p>
         </p:txBody>
       </p:sp>
@@ -19903,7 +20747,7 @@
         </p:nvSpPr>
         <p:spPr>
           <a:xfrm>
-            <a:off x="1597986" y="2057424"/>
+            <a:off x="1597986" y="2118728"/>
             <a:ext cx="2776756" cy="286349"/>
           </a:xfrm>
           <a:prstGeom prst="rect">
@@ -19935,15 +20779,38 @@
           <a:lstStyle/>
           <a:p>
             <a:r>
-              <a:rPr lang="en-US" sz="2000" b="1" dirty="0" smtClean="0">
-                <a:solidFill>
-                  <a:schemeClr val="tx1"/>
-                </a:solidFill>
-                <a:latin typeface="Calibri Light" panose="020F0302020204030204" pitchFamily="34" charset="0"/>
-                <a:cs typeface="Calibri Light" panose="020F0302020204030204" pitchFamily="34" charset="0"/>
-              </a:rPr>
-              <a:t>…</a:t>
-            </a:r>
+              <a:rPr lang="en-US" sz="1200" b="1" dirty="0" smtClean="0">
+                <a:solidFill>
+                  <a:schemeClr val="bg1">
+                    <a:lumMod val="50000"/>
+                  </a:schemeClr>
+                </a:solidFill>
+                <a:latin typeface="Calibri Light" panose="020F0302020204030204" pitchFamily="34" charset="0"/>
+                <a:cs typeface="Calibri Light" panose="020F0302020204030204" pitchFamily="34" charset="0"/>
+              </a:rPr>
+              <a:t>(More categories</a:t>
+            </a:r>
+            <a:r>
+              <a:rPr lang="is-IS" sz="1200" b="1" dirty="0" smtClean="0">
+                <a:solidFill>
+                  <a:schemeClr val="bg1">
+                    <a:lumMod val="50000"/>
+                  </a:schemeClr>
+                </a:solidFill>
+                <a:latin typeface="Calibri Light" panose="020F0302020204030204" pitchFamily="34" charset="0"/>
+                <a:cs typeface="Calibri Light" panose="020F0302020204030204" pitchFamily="34" charset="0"/>
+              </a:rPr>
+              <a:t>…)</a:t>
+            </a:r>
+            <a:endParaRPr lang="en-US" sz="1200" b="1" dirty="0" smtClean="0">
+              <a:solidFill>
+                <a:schemeClr val="bg1">
+                  <a:lumMod val="50000"/>
+                </a:schemeClr>
+              </a:solidFill>
+              <a:latin typeface="Calibri Light" panose="020F0302020204030204" pitchFamily="34" charset="0"/>
+              <a:cs typeface="Calibri Light" panose="020F0302020204030204" pitchFamily="34" charset="0"/>
+            </a:endParaRPr>
           </a:p>
         </p:txBody>
       </p:sp>
@@ -30232,6 +31099,96 @@
           </a:p>
         </p:txBody>
       </p:sp>
+      <p:sp>
+        <p:nvSpPr>
+          <p:cNvPr id="35" name="Rectangle 34"/>
+          <p:cNvSpPr/>
+          <p:nvPr/>
+        </p:nvSpPr>
+        <p:spPr>
+          <a:xfrm>
+            <a:off x="9029683" y="1850603"/>
+            <a:ext cx="2931408" cy="428614"/>
+          </a:xfrm>
+          <a:prstGeom prst="rect">
+            <a:avLst/>
+          </a:prstGeom>
+          <a:solidFill>
+            <a:schemeClr val="bg1">
+              <a:lumMod val="95000"/>
+            </a:schemeClr>
+          </a:solidFill>
+          <a:ln>
+            <a:noFill/>
+          </a:ln>
+        </p:spPr>
+        <p:style>
+          <a:lnRef idx="2">
+            <a:schemeClr val="accent1">
+              <a:shade val="50000"/>
+            </a:schemeClr>
+          </a:lnRef>
+          <a:fillRef idx="1">
+            <a:schemeClr val="accent1"/>
+          </a:fillRef>
+          <a:effectRef idx="0">
+            <a:schemeClr val="accent1"/>
+          </a:effectRef>
+          <a:fontRef idx="minor">
+            <a:schemeClr val="lt1"/>
+          </a:fontRef>
+        </p:style>
+        <p:txBody>
+          <a:bodyPr rtlCol="0" anchor="ctr"/>
+          <a:lstStyle/>
+          <a:p>
+            <a:pPr algn="ctr"/>
+            <a:r>
+              <a:rPr lang="en-US" dirty="0" smtClean="0">
+                <a:solidFill>
+                  <a:sysClr val="windowText" lastClr="000000"/>
+                </a:solidFill>
+              </a:rPr>
+              <a:t>Wedding</a:t>
+            </a:r>
+            <a:endParaRPr lang="en-US" dirty="0">
+              <a:solidFill>
+                <a:sysClr val="windowText" lastClr="000000"/>
+              </a:solidFill>
+            </a:endParaRPr>
+          </a:p>
+        </p:txBody>
+      </p:sp>
+      <p:pic>
+        <p:nvPicPr>
+          <p:cNvPr id="36" name="Picture 35"/>
+          <p:cNvPicPr>
+            <a:picLocks noChangeAspect="1"/>
+          </p:cNvPicPr>
+          <p:nvPr/>
+        </p:nvPicPr>
+        <p:blipFill>
+          <a:blip r:embed="rId3" cstate="print">
+            <a:extLst>
+              <a:ext uri="{28A0092B-C50C-407E-A947-70E740481C1C}">
+                <a14:useLocalDpi xmlns:a14="http://schemas.microsoft.com/office/drawing/2010/main" val="0"/>
+              </a:ext>
+            </a:extLst>
+          </a:blip>
+          <a:stretch>
+            <a:fillRect/>
+          </a:stretch>
+        </p:blipFill>
+        <p:spPr>
+          <a:xfrm flipH="1">
+            <a:off x="11274402" y="1963216"/>
+            <a:ext cx="222295" cy="222295"/>
+          </a:xfrm>
+          <a:prstGeom prst="rect">
+            <a:avLst/>
+          </a:prstGeom>
+        </p:spPr>
+      </p:pic>
     </p:spTree>
     <p:extLst>
       <p:ext uri="{BB962C8B-B14F-4D97-AF65-F5344CB8AC3E}">
@@ -33261,6 +34218,96 @@
           </a:p>
         </p:txBody>
       </p:sp>
+      <p:sp>
+        <p:nvSpPr>
+          <p:cNvPr id="41" name="Rectangle 40"/>
+          <p:cNvSpPr/>
+          <p:nvPr/>
+        </p:nvSpPr>
+        <p:spPr>
+          <a:xfrm>
+            <a:off x="9029683" y="1850603"/>
+            <a:ext cx="2931408" cy="428614"/>
+          </a:xfrm>
+          <a:prstGeom prst="rect">
+            <a:avLst/>
+          </a:prstGeom>
+          <a:solidFill>
+            <a:schemeClr val="bg1">
+              <a:lumMod val="95000"/>
+            </a:schemeClr>
+          </a:solidFill>
+          <a:ln>
+            <a:noFill/>
+          </a:ln>
+        </p:spPr>
+        <p:style>
+          <a:lnRef idx="2">
+            <a:schemeClr val="accent1">
+              <a:shade val="50000"/>
+            </a:schemeClr>
+          </a:lnRef>
+          <a:fillRef idx="1">
+            <a:schemeClr val="accent1"/>
+          </a:fillRef>
+          <a:effectRef idx="0">
+            <a:schemeClr val="accent1"/>
+          </a:effectRef>
+          <a:fontRef idx="minor">
+            <a:schemeClr val="lt1"/>
+          </a:fontRef>
+        </p:style>
+        <p:txBody>
+          <a:bodyPr rtlCol="0" anchor="ctr"/>
+          <a:lstStyle/>
+          <a:p>
+            <a:pPr algn="ctr"/>
+            <a:r>
+              <a:rPr lang="en-US" dirty="0" smtClean="0">
+                <a:solidFill>
+                  <a:sysClr val="windowText" lastClr="000000"/>
+                </a:solidFill>
+              </a:rPr>
+              <a:t>Wedding</a:t>
+            </a:r>
+            <a:endParaRPr lang="en-US" dirty="0">
+              <a:solidFill>
+                <a:sysClr val="windowText" lastClr="000000"/>
+              </a:solidFill>
+            </a:endParaRPr>
+          </a:p>
+        </p:txBody>
+      </p:sp>
+      <p:pic>
+        <p:nvPicPr>
+          <p:cNvPr id="42" name="Picture 41"/>
+          <p:cNvPicPr>
+            <a:picLocks noChangeAspect="1"/>
+          </p:cNvPicPr>
+          <p:nvPr/>
+        </p:nvPicPr>
+        <p:blipFill>
+          <a:blip r:embed="rId3" cstate="print">
+            <a:extLst>
+              <a:ext uri="{28A0092B-C50C-407E-A947-70E740481C1C}">
+                <a14:useLocalDpi xmlns:a14="http://schemas.microsoft.com/office/drawing/2010/main" val="0"/>
+              </a:ext>
+            </a:extLst>
+          </a:blip>
+          <a:stretch>
+            <a:fillRect/>
+          </a:stretch>
+        </p:blipFill>
+        <p:spPr>
+          <a:xfrm flipH="1">
+            <a:off x="11274402" y="1963216"/>
+            <a:ext cx="222295" cy="222295"/>
+          </a:xfrm>
+          <a:prstGeom prst="rect">
+            <a:avLst/>
+          </a:prstGeom>
+        </p:spPr>
+      </p:pic>
     </p:spTree>
     <p:extLst>
       <p:ext uri="{BB962C8B-B14F-4D97-AF65-F5344CB8AC3E}">
@@ -34840,37 +35887,7 @@
                   <a:latin typeface="Calibri Light" panose="020F0302020204030204" pitchFamily="34" charset="0"/>
                   <a:cs typeface="Calibri Light" panose="020F0302020204030204" pitchFamily="34" charset="0"/>
                 </a:rPr>
-                <a:t>Fee: </a:t>
-              </a:r>
-              <a:r>
-                <a:rPr lang="en-US" sz="1100" dirty="0" smtClean="0">
-                  <a:solidFill>
-                    <a:schemeClr val="tx1"/>
-                  </a:solidFill>
-                  <a:latin typeface="Calibri Light" panose="020F0302020204030204" pitchFamily="34" charset="0"/>
-                  <a:cs typeface="Calibri Light" panose="020F0302020204030204" pitchFamily="34" charset="0"/>
-                </a:rPr>
-                <a:t>20</a:t>
-              </a:r>
-              <a:r>
-                <a:rPr lang="en-US" sz="1100" dirty="0" smtClean="0">
-                  <a:solidFill>
-                    <a:schemeClr val="tx1"/>
-                  </a:solidFill>
-                  <a:latin typeface="Calibri Light" panose="020F0302020204030204" pitchFamily="34" charset="0"/>
-                  <a:cs typeface="Calibri Light" panose="020F0302020204030204" pitchFamily="34" charset="0"/>
-                </a:rPr>
-                <a:t>00 </a:t>
-              </a:r>
-              <a:r>
-                <a:rPr lang="en-US" sz="1100" dirty="0" smtClean="0">
-                  <a:solidFill>
-                    <a:schemeClr val="tx1"/>
-                  </a:solidFill>
-                  <a:latin typeface="Calibri Light" panose="020F0302020204030204" pitchFamily="34" charset="0"/>
-                  <a:cs typeface="Calibri Light" panose="020F0302020204030204" pitchFamily="34" charset="0"/>
-                </a:rPr>
-                <a:t>$ - day</a:t>
+                <a:t>Fee: 2000 $ - day</a:t>
               </a:r>
             </a:p>
             <a:p>
@@ -34882,27 +35899,7 @@
                   <a:latin typeface="Calibri Light" panose="020F0302020204030204" pitchFamily="34" charset="0"/>
                   <a:cs typeface="Calibri Light" panose="020F0302020204030204" pitchFamily="34" charset="0"/>
                 </a:rPr>
-                <a:t>Additional travel charge: </a:t>
-              </a:r>
-              <a:r>
-                <a:rPr lang="en-US" sz="1100" dirty="0" smtClean="0">
-                  <a:solidFill>
-                    <a:schemeClr val="tx1"/>
-                  </a:solidFill>
-                  <a:latin typeface="Calibri Light" panose="020F0302020204030204" pitchFamily="34" charset="0"/>
-                  <a:cs typeface="Calibri Light" panose="020F0302020204030204" pitchFamily="34" charset="0"/>
-                </a:rPr>
-                <a:t>100</a:t>
-              </a:r>
-              <a:r>
-                <a:rPr lang="en-US" sz="1100" dirty="0" smtClean="0">
-                  <a:solidFill>
-                    <a:schemeClr val="tx1"/>
-                  </a:solidFill>
-                  <a:latin typeface="Calibri Light" panose="020F0302020204030204" pitchFamily="34" charset="0"/>
-                  <a:cs typeface="Calibri Light" panose="020F0302020204030204" pitchFamily="34" charset="0"/>
-                </a:rPr>
-                <a:t>$ - day</a:t>
+                <a:t>Additional travel charge: 100$ - day</a:t>
               </a:r>
             </a:p>
             <a:p>
@@ -34914,27 +35911,7 @@
                   <a:latin typeface="Calibri Light" panose="020F0302020204030204" pitchFamily="34" charset="0"/>
                   <a:cs typeface="Calibri Light" panose="020F0302020204030204" pitchFamily="34" charset="0"/>
                 </a:rPr>
-                <a:t>Not include hotel </a:t>
-              </a:r>
-              <a:r>
-                <a:rPr lang="en-US" sz="1100" dirty="0" smtClean="0">
-                  <a:solidFill>
-                    <a:schemeClr val="tx1"/>
-                  </a:solidFill>
-                  <a:latin typeface="Calibri Light" panose="020F0302020204030204" pitchFamily="34" charset="0"/>
-                  <a:cs typeface="Calibri Light" panose="020F0302020204030204" pitchFamily="34" charset="0"/>
-                </a:rPr>
-                <a:t>– meals – travel fee. </a:t>
-              </a:r>
-              <a:r>
-                <a:rPr lang="en-US" sz="1100" dirty="0" smtClean="0">
-                  <a:solidFill>
-                    <a:schemeClr val="tx1"/>
-                  </a:solidFill>
-                  <a:latin typeface="Calibri Light" panose="020F0302020204030204" pitchFamily="34" charset="0"/>
-                  <a:cs typeface="Calibri Light" panose="020F0302020204030204" pitchFamily="34" charset="0"/>
-                </a:rPr>
-                <a:t>Free in cancellation(*)</a:t>
+                <a:t>Not include hotel – meals – travel fee. Free in cancellation(*)</a:t>
               </a:r>
             </a:p>
             <a:p>
@@ -35114,13 +36091,6 @@
               </a:rPr>
               <a:t>Where to take</a:t>
             </a:r>
-            <a:endParaRPr lang="en-US" sz="1200" dirty="0" smtClean="0">
-              <a:solidFill>
-                <a:schemeClr val="tx1"/>
-              </a:solidFill>
-              <a:latin typeface="Calibri Light" panose="020F0302020204030204" pitchFamily="34" charset="0"/>
-              <a:cs typeface="Calibri Light" panose="020F0302020204030204" pitchFamily="34" charset="0"/>
-            </a:endParaRPr>
           </a:p>
         </p:txBody>
       </p:sp>
@@ -35279,13 +36249,6 @@
               </a:rPr>
               <a:t>2000$ x 2 day(s)</a:t>
             </a:r>
-            <a:endParaRPr lang="en-US" sz="1100" dirty="0" smtClean="0">
-              <a:solidFill>
-                <a:schemeClr val="tx1"/>
-              </a:solidFill>
-              <a:latin typeface="Calibri Light" panose="020F0302020204030204" pitchFamily="34" charset="0"/>
-              <a:cs typeface="Calibri Light" panose="020F0302020204030204" pitchFamily="34" charset="0"/>
-            </a:endParaRPr>
           </a:p>
         </p:txBody>
       </p:sp>
@@ -35689,17 +36652,7 @@
                 <a:latin typeface="Calibri Light" panose="020F0302020204030204" pitchFamily="34" charset="0"/>
                 <a:cs typeface="Calibri Light" panose="020F0302020204030204" pitchFamily="34" charset="0"/>
               </a:rPr>
-              <a:t>000 </a:t>
-            </a:r>
-            <a:r>
-              <a:rPr lang="en-US" sz="1100" b="1" dirty="0" smtClean="0">
-                <a:solidFill>
-                  <a:schemeClr val="tx1"/>
-                </a:solidFill>
-                <a:latin typeface="Calibri Light" panose="020F0302020204030204" pitchFamily="34" charset="0"/>
-                <a:cs typeface="Calibri Light" panose="020F0302020204030204" pitchFamily="34" charset="0"/>
-              </a:rPr>
-              <a:t>$</a:t>
+              <a:t>000 $</a:t>
             </a:r>
           </a:p>
         </p:txBody>
@@ -35902,13 +36855,6 @@
               </a:rPr>
               <a:t>Included tax</a:t>
             </a:r>
-            <a:endParaRPr lang="en-US" sz="1100" i="1" dirty="0" smtClean="0">
-              <a:solidFill>
-                <a:schemeClr val="tx1"/>
-              </a:solidFill>
-              <a:latin typeface="Calibri Light" panose="020F0302020204030204" pitchFamily="34" charset="0"/>
-              <a:cs typeface="Calibri Light" panose="020F0302020204030204" pitchFamily="34" charset="0"/>
-            </a:endParaRPr>
           </a:p>
         </p:txBody>
       </p:sp>
@@ -35961,13 +36907,6 @@
               </a:rPr>
               <a:t>Category</a:t>
             </a:r>
-            <a:endParaRPr lang="en-US" sz="1200" dirty="0" smtClean="0">
-              <a:solidFill>
-                <a:schemeClr val="tx1"/>
-              </a:solidFill>
-              <a:latin typeface="Calibri Light" panose="020F0302020204030204" pitchFamily="34" charset="0"/>
-              <a:cs typeface="Calibri Light" panose="020F0302020204030204" pitchFamily="34" charset="0"/>
-            </a:endParaRPr>
           </a:p>
         </p:txBody>
       </p:sp>
@@ -36021,13 +36960,6 @@
               </a:rPr>
               <a:t>Wedding</a:t>
             </a:r>
-            <a:endParaRPr lang="en-US" sz="1100" dirty="0" smtClean="0">
-              <a:solidFill>
-                <a:schemeClr val="tx1"/>
-              </a:solidFill>
-              <a:latin typeface="Calibri Light" panose="020F0302020204030204" pitchFamily="34" charset="0"/>
-              <a:cs typeface="Calibri Light" panose="020F0302020204030204" pitchFamily="34" charset="0"/>
-            </a:endParaRPr>
           </a:p>
         </p:txBody>
       </p:sp>

</xml_diff>